<commit_message>
fixes numbering of chapter 3
</commit_message>
<xml_diff>
--- a/PalMod2022/docs/ppt/3_Lets_Get_Started.pptx
+++ b/PalMod2022/docs/ppt/3_Lets_Get_Started.pptx
@@ -3184,7 +3184,11 @@
             <a:pPr algn="ctr"/>
             <a:r>
               <a:rPr lang="tr-TR" sz="1000" smtClean="0"/>
-              <a:t>1 / 8</a:t>
+              <a:t>1 / </a:t>
+            </a:r>
+            <a:r>
+              <a:rPr lang="tr-TR" sz="1000" smtClean="0"/>
+              <a:t>6</a:t>
             </a:r>
             <a:endParaRPr lang="tr-TR" sz="1000"/>
           </a:p>
@@ -4478,7 +4482,11 @@
             <a:pPr algn="ctr"/>
             <a:r>
               <a:rPr lang="tr-TR" sz="1000" smtClean="0"/>
-              <a:t>2 / 8</a:t>
+              <a:t>2 / </a:t>
+            </a:r>
+            <a:r>
+              <a:rPr lang="tr-TR" sz="1000" smtClean="0"/>
+              <a:t>6</a:t>
             </a:r>
             <a:endParaRPr lang="tr-TR" sz="1000"/>
           </a:p>
@@ -8393,7 +8401,11 @@
             <a:pPr algn="ctr"/>
             <a:r>
               <a:rPr lang="tr-TR" sz="1000" smtClean="0"/>
-              <a:t>4 / 8</a:t>
+              <a:t>4 / </a:t>
+            </a:r>
+            <a:r>
+              <a:rPr lang="tr-TR" sz="1000" smtClean="0"/>
+              <a:t>6</a:t>
             </a:r>
             <a:endParaRPr lang="tr-TR" sz="1000"/>
           </a:p>
@@ -8441,7 +8453,7 @@
           <p:cNvPr id="2" name="Title 1">
             <a:extLst>
               <a:ext uri="{FF2B5EF4-FFF2-40B4-BE49-F238E27FC236}">
-                <a16:creationId xmlns:a16="http://schemas.microsoft.com/office/drawing/2014/main" xmlns="" id="{1049E8DC-5F37-594E-BD4A-0E7E77983795}"/>
+                <a16:creationId xmlns="" xmlns:a16="http://schemas.microsoft.com/office/drawing/2014/main" id="{1049E8DC-5F37-594E-BD4A-0E7E77983795}"/>
               </a:ext>
             </a:extLst>
           </p:cNvPr>
@@ -8625,7 +8637,7 @@
           <p:cNvPr id="8" name="Title 1">
             <a:extLst>
               <a:ext uri="{FF2B5EF4-FFF2-40B4-BE49-F238E27FC236}">
-                <a16:creationId xmlns:a16="http://schemas.microsoft.com/office/drawing/2014/main" xmlns="" id="{1049E8DC-5F37-594E-BD4A-0E7E77983795}"/>
+                <a16:creationId xmlns="" xmlns:a16="http://schemas.microsoft.com/office/drawing/2014/main" id="{1049E8DC-5F37-594E-BD4A-0E7E77983795}"/>
               </a:ext>
             </a:extLst>
           </p:cNvPr>
@@ -9017,8 +9029,20 @@
           <a:p>
             <a:pPr algn="ctr"/>
             <a:r>
+              <a:rPr lang="tr-TR" sz="1000"/>
+              <a:t>5</a:t>
+            </a:r>
+            <a:r>
               <a:rPr lang="tr-TR" sz="1000" smtClean="0"/>
-              <a:t>7 / 8</a:t>
+              <a:t> </a:t>
+            </a:r>
+            <a:r>
+              <a:rPr lang="tr-TR" sz="1000" smtClean="0"/>
+              <a:t>/ </a:t>
+            </a:r>
+            <a:r>
+              <a:rPr lang="tr-TR" sz="1000" smtClean="0"/>
+              <a:t>6</a:t>
             </a:r>
             <a:endParaRPr lang="tr-TR" sz="1000"/>
           </a:p>
@@ -9430,11 +9454,7 @@
             <a:pPr algn="ctr"/>
             <a:r>
               <a:rPr lang="tr-TR" sz="1000" smtClean="0"/>
-              <a:t>6 / </a:t>
-            </a:r>
-            <a:r>
-              <a:rPr lang="tr-TR" sz="1000" smtClean="0"/>
-              <a:t>6</a:t>
+              <a:t>6 / 6</a:t>
             </a:r>
             <a:endParaRPr lang="tr-TR" sz="1000"/>
           </a:p>

</xml_diff>